<commit_message>
Add day 7 solutions, day8 slides
</commit_message>
<xml_diff>
--- a/presentations/edatc21_slides_07_spinw2.pptx
+++ b/presentations/edatc21_slides_07_spinw2.pptx
@@ -20435,8 +20435,8 @@
         </p:nvSpPr>
         <p:spPr>
           <a:xfrm>
-            <a:off x="941549" y="1273842"/>
-            <a:ext cx="7336936" cy="1092607"/>
+            <a:off x="941549" y="652742"/>
+            <a:ext cx="7336936" cy="1692771"/>
           </a:xfrm>
           <a:prstGeom prst="rect">
             <a:avLst/>
@@ -20596,8 +20596,67 @@
                 <a:latin typeface="Courier New" panose="02070309020205020404" pitchFamily="49" charset="0"/>
                 <a:cs typeface="Courier New" panose="02070309020205020404" pitchFamily="49" charset="0"/>
               </a:rPr>
-              <a:t>', [0 0 1], 'k', [1/3 1/3 0])</a:t>
-            </a:r>
+              <a:t>', [0 0 1], 'k', [1/3 1/3 0</a:t>
+            </a:r>
+            <a:r>
+              <a:rPr lang="en-GB" sz="1300" dirty="0" smtClean="0">
+                <a:latin typeface="Courier New" panose="02070309020205020404" pitchFamily="49" charset="0"/>
+                <a:cs typeface="Courier New" panose="02070309020205020404" pitchFamily="49" charset="0"/>
+              </a:rPr>
+              <a:t>])</a:t>
+            </a:r>
+          </a:p>
+          <a:p>
+            <a:r>
+              <a:rPr lang="en-GB" sz="1300" dirty="0" err="1" smtClean="0">
+                <a:latin typeface="Courier New" panose="02070309020205020404" pitchFamily="49" charset="0"/>
+                <a:cs typeface="Courier New" panose="02070309020205020404" pitchFamily="49" charset="0"/>
+              </a:rPr>
+              <a:t>tri.addmatrix</a:t>
+            </a:r>
+            <a:r>
+              <a:rPr lang="en-GB" sz="1300" dirty="0" smtClean="0">
+                <a:latin typeface="Courier New" panose="02070309020205020404" pitchFamily="49" charset="0"/>
+                <a:cs typeface="Courier New" panose="02070309020205020404" pitchFamily="49" charset="0"/>
+              </a:rPr>
+              <a:t>('label', 'J', 'value', 1)</a:t>
+            </a:r>
+          </a:p>
+          <a:p>
+            <a:r>
+              <a:rPr lang="en-GB" sz="1300" dirty="0" err="1" smtClean="0">
+                <a:latin typeface="Courier New" panose="02070309020205020404" pitchFamily="49" charset="0"/>
+                <a:cs typeface="Courier New" panose="02070309020205020404" pitchFamily="49" charset="0"/>
+              </a:rPr>
+              <a:t>tri.gencoupling</a:t>
+            </a:r>
+            <a:r>
+              <a:rPr lang="en-GB" sz="1300" dirty="0" smtClean="0">
+                <a:latin typeface="Courier New" panose="02070309020205020404" pitchFamily="49" charset="0"/>
+                <a:cs typeface="Courier New" panose="02070309020205020404" pitchFamily="49" charset="0"/>
+              </a:rPr>
+              <a:t>();</a:t>
+            </a:r>
+          </a:p>
+          <a:p>
+            <a:r>
+              <a:rPr lang="en-GB" sz="1300" dirty="0" err="1" smtClean="0">
+                <a:latin typeface="Courier New" panose="02070309020205020404" pitchFamily="49" charset="0"/>
+                <a:cs typeface="Courier New" panose="02070309020205020404" pitchFamily="49" charset="0"/>
+              </a:rPr>
+              <a:t>tri.addcoupling</a:t>
+            </a:r>
+            <a:r>
+              <a:rPr lang="en-GB" sz="1300" dirty="0" smtClean="0">
+                <a:latin typeface="Courier New" panose="02070309020205020404" pitchFamily="49" charset="0"/>
+                <a:cs typeface="Courier New" panose="02070309020205020404" pitchFamily="49" charset="0"/>
+              </a:rPr>
+              <a:t>('mat', 'J', 'bond', 1);</a:t>
+            </a:r>
+            <a:endParaRPr lang="en-GB" sz="1300" dirty="0">
+              <a:latin typeface="Courier New" panose="02070309020205020404" pitchFamily="49" charset="0"/>
+              <a:cs typeface="Courier New" panose="02070309020205020404" pitchFamily="49" charset="0"/>
+            </a:endParaRPr>
           </a:p>
         </p:txBody>
       </p:sp>
@@ -23963,7 +24022,7 @@
                 <a:latin typeface="Courier New" panose="02070309020205020404" pitchFamily="49" charset="0"/>
                 <a:cs typeface="Courier New" panose="02070309020205020404" pitchFamily="49" charset="0"/>
               </a:rPr>
-              <a:t>('pol', true, '</a:t>
+              <a:t>(spec, 'pol', true, '</a:t>
             </a:r>
             <a:r>
               <a:rPr lang="en-GB" sz="1300" dirty="0" err="1" smtClean="0">
@@ -24086,11 +24145,18 @@
               <a:t>sw_neutron</a:t>
             </a:r>
             <a:r>
+              <a:rPr lang="en-GB" sz="1300" smtClean="0">
+                <a:latin typeface="Courier New" panose="02070309020205020404" pitchFamily="49" charset="0"/>
+                <a:cs typeface="Courier New" panose="02070309020205020404" pitchFamily="49" charset="0"/>
+              </a:rPr>
+              <a:t>(spec, 'pol</a:t>
+            </a:r>
+            <a:r>
               <a:rPr lang="en-GB" sz="1300" dirty="0" smtClean="0">
                 <a:latin typeface="Courier New" panose="02070309020205020404" pitchFamily="49" charset="0"/>
                 <a:cs typeface="Courier New" panose="02070309020205020404" pitchFamily="49" charset="0"/>
               </a:rPr>
-              <a:t>('pol', true, 'n', [0,0,1])</a:t>
+              <a:t>', true, 'n', [0,0,1])</a:t>
             </a:r>
           </a:p>
           <a:p>

</xml_diff>